<commit_message>
UPDATE OSI_TCP.pptx and ADD capture.png
</commit_message>
<xml_diff>
--- a/homework2_OSI_TCP/OSI_TCP.pptx
+++ b/homework2_OSI_TCP/OSI_TCP.pptx
@@ -104,6 +104,11 @@
       </a:defRPr>
     </a:lvl9pPr>
   </p:defaultTextStyle>
+  <p:extLst>
+    <p:ext uri="{EFAFB233-063F-42B5-8137-9DF3F51BA10A}">
+      <p15:sldGuideLst xmlns:p15="http://schemas.microsoft.com/office/powerpoint/2012/main"/>
+    </p:ext>
+  </p:extLst>
 </p:presentation>
 </file>
 
@@ -3336,14 +3341,14 @@
           <p:nvPr>
             <p:extLst>
               <p:ext uri="{D42A27DB-BD31-4B8C-83A1-F6EECF244321}">
-                <p14:modId xmlns:p14="http://schemas.microsoft.com/office/powerpoint/2010/main" val="4150589976"/>
+                <p14:modId xmlns:p14="http://schemas.microsoft.com/office/powerpoint/2010/main" val="720178662"/>
               </p:ext>
             </p:extLst>
           </p:nvPr>
         </p:nvGraphicFramePr>
         <p:xfrm>
           <a:off x="0" y="0"/>
-          <a:ext cx="12192000" cy="7852410"/>
+          <a:ext cx="12192000" cy="6945514"/>
         </p:xfrm>
         <a:graphic>
           <a:graphicData uri="http://schemas.openxmlformats.org/drawingml/2006/table">
@@ -3388,7 +3393,7 @@
                   </a:extLst>
                 </a:gridCol>
               </a:tblGrid>
-              <a:tr h="857250">
+              <a:tr h="804982">
                 <a:tc>
                   <a:txBody>
                     <a:bodyPr/>
@@ -3466,7 +3471,7 @@
                   </a:ext>
                 </a:extLst>
               </a:tr>
-              <a:tr h="857250">
+              <a:tr h="804982">
                 <a:tc>
                   <a:txBody>
                     <a:bodyPr/>
@@ -3505,7 +3510,23 @@
                       <a:pPr latinLnBrk="1"/>
                       <a:r>
                         <a:rPr lang="en-US" altLang="ko-KR" sz="3600" dirty="0"/>
-                        <a:t>L7(Firewall)</a:t>
+                        <a:t>L7(</a:t>
+                      </a:r>
+                      <a:r>
+                        <a:rPr lang="en-US" altLang="ko-KR" sz="3600" dirty="0" err="1"/>
+                        <a:t>Firewall,IPS</a:t>
+                      </a:r>
+                      <a:r>
+                        <a:rPr lang="en-US" altLang="ko-KR" sz="3600" dirty="0"/>
+                        <a:t>,</a:t>
+                      </a:r>
+                      <a:r>
+                        <a:rPr lang="ko-KR" altLang="en-US" sz="3600"/>
+                        <a:t> </a:t>
+                      </a:r>
+                      <a:r>
+                        <a:rPr lang="en-US" altLang="ko-KR" sz="3600"/>
+                        <a:t>…)</a:t>
                       </a:r>
                       <a:endParaRPr lang="ko-KR" altLang="en-US" sz="4000" dirty="0"/>
                     </a:p>
@@ -3535,7 +3556,7 @@
                       <a:pPr latinLnBrk="1"/>
                       <a:r>
                         <a:rPr lang="en-US" altLang="ko-KR" sz="3600" dirty="0"/>
-                        <a:t>FTP, Telnet, …</a:t>
+                        <a:t>FTP, SSH, …</a:t>
                       </a:r>
                       <a:endParaRPr lang="ko-KR" altLang="en-US" sz="3600" dirty="0"/>
                     </a:p>
@@ -3548,7 +3569,7 @@
                   </a:ext>
                 </a:extLst>
               </a:tr>
-              <a:tr h="857250">
+              <a:tr h="804982">
                 <a:tc>
                   <a:txBody>
                     <a:bodyPr/>
@@ -3618,7 +3639,7 @@
                   </a:ext>
                 </a:extLst>
               </a:tr>
-              <a:tr h="857250">
+              <a:tr h="804982">
                 <a:tc>
                   <a:txBody>
                     <a:bodyPr/>
@@ -3688,7 +3709,7 @@
                   </a:ext>
                 </a:extLst>
               </a:tr>
-              <a:tr h="857250">
+              <a:tr h="1223124">
                 <a:tc>
                   <a:txBody>
                     <a:bodyPr/>
@@ -3727,7 +3748,15 @@
                       <a:pPr latinLnBrk="1"/>
                       <a:r>
                         <a:rPr lang="en-US" altLang="ko-KR" sz="4000" dirty="0"/>
-                        <a:t>L4(NAT)</a:t>
+                        <a:t>L4(NAT,</a:t>
+                      </a:r>
+                      <a:r>
+                        <a:rPr lang="ko-KR" altLang="en-US" sz="4000" dirty="0"/>
+                        <a:t> 공유기</a:t>
+                      </a:r>
+                      <a:r>
+                        <a:rPr lang="en-US" altLang="ko-KR" sz="4000" dirty="0"/>
+                        <a:t>)</a:t>
                       </a:r>
                       <a:endParaRPr lang="ko-KR" altLang="en-US" sz="4000" dirty="0"/>
                     </a:p>
@@ -3757,7 +3786,7 @@
                       <a:pPr latinLnBrk="1"/>
                       <a:r>
                         <a:rPr lang="en-US" altLang="ko-KR" sz="3600" dirty="0"/>
-                        <a:t>UDP, ICMP(?), …</a:t>
+                        <a:t>UDP, ICMP</a:t>
                       </a:r>
                       <a:endParaRPr lang="ko-KR" altLang="en-US" sz="3600" dirty="0"/>
                     </a:p>
@@ -3770,7 +3799,7 @@
                   </a:ext>
                 </a:extLst>
               </a:tr>
-              <a:tr h="857250">
+              <a:tr h="804982">
                 <a:tc>
                   <a:txBody>
                     <a:bodyPr/>
@@ -3809,7 +3838,7 @@
                       <a:pPr latinLnBrk="1"/>
                       <a:r>
                         <a:rPr lang="en-US" altLang="ko-KR" sz="4000" dirty="0"/>
-                        <a:t>L4(Router)</a:t>
+                        <a:t>L3(Router)</a:t>
                       </a:r>
                       <a:endParaRPr lang="ko-KR" altLang="en-US" sz="4000" dirty="0"/>
                     </a:p>
@@ -3839,7 +3868,7 @@
                       <a:pPr latinLnBrk="1"/>
                       <a:r>
                         <a:rPr lang="en-US" altLang="ko-KR" sz="3600" dirty="0"/>
-                        <a:t>IP6, ARP(?), …</a:t>
+                        <a:t>IP6, ARP</a:t>
                       </a:r>
                       <a:endParaRPr lang="ko-KR" altLang="en-US" sz="3600" dirty="0"/>
                     </a:p>
@@ -3852,7 +3881,7 @@
                   </a:ext>
                 </a:extLst>
               </a:tr>
-              <a:tr h="857250">
+              <a:tr h="804982">
                 <a:tc>
                   <a:txBody>
                     <a:bodyPr/>
@@ -3921,7 +3950,7 @@
                       <a:pPr latinLnBrk="1"/>
                       <a:r>
                         <a:rPr lang="en-US" altLang="ko-KR" sz="3600" dirty="0"/>
-                        <a:t>PPP,HDLCC, …</a:t>
+                        <a:t>PPP,HDLCC</a:t>
                       </a:r>
                       <a:endParaRPr lang="ko-KR" altLang="en-US" sz="3600" dirty="0"/>
                     </a:p>
@@ -3934,7 +3963,7 @@
                   </a:ext>
                 </a:extLst>
               </a:tr>
-              <a:tr h="857250">
+              <a:tr h="804982">
                 <a:tc>
                   <a:txBody>
                     <a:bodyPr/>
@@ -3971,7 +4000,7 @@
                     <a:lstStyle/>
                     <a:p>
                       <a:pPr latinLnBrk="1"/>
-                      <a:endParaRPr lang="ko-KR" altLang="en-US" sz="4000"/>
+                      <a:endParaRPr lang="ko-KR" altLang="en-US" sz="4000" dirty="0"/>
                     </a:p>
                   </a:txBody>
                   <a:tcPr/>

</xml_diff>